<commit_message>
updating diagrams, fixed caption for fig 5
</commit_message>
<xml_diff>
--- a/ews-venn.pptx
+++ b/ews-venn.pptx
@@ -285,7 +285,7 @@
           <a:lstStyle/>
           <a:p>
             <a:fld id="{1A79BAA1-E470-9F41-B0AC-6FECC0172A87}" type="datetimeFigureOut">
-              <a:t>1/12/13</a:t>
+              <a:t>3/6/13</a:t>
             </a:fld>
             <a:endParaRPr lang="en-US"/>
           </a:p>
@@ -451,7 +451,7 @@
           <a:lstStyle/>
           <a:p>
             <a:fld id="{1A79BAA1-E470-9F41-B0AC-6FECC0172A87}" type="datetimeFigureOut">
-              <a:t>1/12/13</a:t>
+              <a:t>3/6/13</a:t>
             </a:fld>
             <a:endParaRPr lang="en-US"/>
           </a:p>
@@ -627,7 +627,7 @@
           <a:lstStyle/>
           <a:p>
             <a:fld id="{1A79BAA1-E470-9F41-B0AC-6FECC0172A87}" type="datetimeFigureOut">
-              <a:t>1/12/13</a:t>
+              <a:t>3/6/13</a:t>
             </a:fld>
             <a:endParaRPr lang="en-US"/>
           </a:p>
@@ -793,7 +793,7 @@
           <a:lstStyle/>
           <a:p>
             <a:fld id="{1A79BAA1-E470-9F41-B0AC-6FECC0172A87}" type="datetimeFigureOut">
-              <a:t>1/12/13</a:t>
+              <a:t>3/6/13</a:t>
             </a:fld>
             <a:endParaRPr lang="en-US"/>
           </a:p>
@@ -1036,7 +1036,7 @@
           <a:lstStyle/>
           <a:p>
             <a:fld id="{1A79BAA1-E470-9F41-B0AC-6FECC0172A87}" type="datetimeFigureOut">
-              <a:t>1/12/13</a:t>
+              <a:t>3/6/13</a:t>
             </a:fld>
             <a:endParaRPr lang="en-US"/>
           </a:p>
@@ -1319,7 +1319,7 @@
           <a:lstStyle/>
           <a:p>
             <a:fld id="{1A79BAA1-E470-9F41-B0AC-6FECC0172A87}" type="datetimeFigureOut">
-              <a:t>1/12/13</a:t>
+              <a:t>3/6/13</a:t>
             </a:fld>
             <a:endParaRPr lang="en-US"/>
           </a:p>
@@ -1736,7 +1736,7 @@
           <a:lstStyle/>
           <a:p>
             <a:fld id="{1A79BAA1-E470-9F41-B0AC-6FECC0172A87}" type="datetimeFigureOut">
-              <a:t>1/12/13</a:t>
+              <a:t>3/6/13</a:t>
             </a:fld>
             <a:endParaRPr lang="en-US"/>
           </a:p>
@@ -1851,7 +1851,7 @@
           <a:lstStyle/>
           <a:p>
             <a:fld id="{1A79BAA1-E470-9F41-B0AC-6FECC0172A87}" type="datetimeFigureOut">
-              <a:t>1/12/13</a:t>
+              <a:t>3/6/13</a:t>
             </a:fld>
             <a:endParaRPr lang="en-US"/>
           </a:p>
@@ -1944,7 +1944,7 @@
           <a:lstStyle/>
           <a:p>
             <a:fld id="{1A79BAA1-E470-9F41-B0AC-6FECC0172A87}" type="datetimeFigureOut">
-              <a:t>1/12/13</a:t>
+              <a:t>3/6/13</a:t>
             </a:fld>
             <a:endParaRPr lang="en-US"/>
           </a:p>
@@ -2217,7 +2217,7 @@
           <a:lstStyle/>
           <a:p>
             <a:fld id="{1A79BAA1-E470-9F41-B0AC-6FECC0172A87}" type="datetimeFigureOut">
-              <a:t>1/12/13</a:t>
+              <a:t>3/6/13</a:t>
             </a:fld>
             <a:endParaRPr lang="en-US"/>
           </a:p>
@@ -2467,7 +2467,7 @@
           <a:lstStyle/>
           <a:p>
             <a:fld id="{1A79BAA1-E470-9F41-B0AC-6FECC0172A87}" type="datetimeFigureOut">
-              <a:t>1/12/13</a:t>
+              <a:t>3/6/13</a:t>
             </a:fld>
             <a:endParaRPr lang="en-US"/>
           </a:p>
@@ -2676,7 +2676,7 @@
           </a:lstStyle>
           <a:p>
             <a:fld id="{1A79BAA1-E470-9F41-B0AC-6FECC0172A87}" type="datetimeFigureOut">
-              <a:t>1/12/13</a:t>
+              <a:t>3/6/13</a:t>
             </a:fld>
             <a:endParaRPr lang="en-US"/>
           </a:p>
@@ -3091,7 +3091,10 @@
           <a:lstStyle/>
           <a:p>
             <a:pPr algn="ctr"/>
-            <a:endParaRPr lang="en-US" i="1"/>
+            <a:endParaRPr lang="en-US" i="1">
+              <a:latin typeface="Lato Light"/>
+              <a:cs typeface="Lato Light"/>
+            </a:endParaRPr>
           </a:p>
         </p:txBody>
       </p:sp>
@@ -3136,7 +3139,10 @@
           <a:lstStyle/>
           <a:p>
             <a:pPr algn="ctr"/>
-            <a:endParaRPr lang="en-US" i="1"/>
+            <a:endParaRPr lang="en-US" i="1">
+              <a:latin typeface="Lato Light"/>
+              <a:cs typeface="Lato Light"/>
+            </a:endParaRPr>
           </a:p>
         </p:txBody>
       </p:sp>
@@ -3181,7 +3187,10 @@
           <a:lstStyle/>
           <a:p>
             <a:pPr algn="ctr"/>
-            <a:endParaRPr lang="en-US" i="1"/>
+            <a:endParaRPr lang="en-US" i="1">
+              <a:latin typeface="Lato Light"/>
+              <a:cs typeface="Lato Light"/>
+            </a:endParaRPr>
           </a:p>
         </p:txBody>
       </p:sp>
@@ -3210,8 +3219,8 @@
             <a:pPr algn="ctr"/>
             <a:r>
               <a:rPr lang="en-US" sz="2000">
-                <a:latin typeface="Helvetica Neue Light"/>
-                <a:cs typeface="Helvetica Neue Light"/>
+                <a:latin typeface="Lato Light"/>
+                <a:cs typeface="Lato Light"/>
               </a:rPr>
               <a:t>Rapid Regime Shifts</a:t>
             </a:r>
@@ -3226,7 +3235,7 @@
         </p:nvSpPr>
         <p:spPr>
           <a:xfrm>
-            <a:off x="1737182" y="4363785"/>
+            <a:off x="1737182" y="4168181"/>
             <a:ext cx="1547700" cy="1015663"/>
           </a:xfrm>
           <a:prstGeom prst="rect">
@@ -3243,8 +3252,8 @@
             <a:pPr algn="ctr"/>
             <a:r>
               <a:rPr lang="en-US" sz="2000">
-                <a:latin typeface="Helvetica Neue Light"/>
-                <a:cs typeface="Helvetica Neue Light"/>
+                <a:latin typeface="Lato Light"/>
+                <a:cs typeface="Lato Light"/>
               </a:rPr>
               <a:t>Critical Slowing Down</a:t>
             </a:r>
@@ -3259,7 +3268,7 @@
         </p:nvSpPr>
         <p:spPr>
           <a:xfrm>
-            <a:off x="6008594" y="4649463"/>
+            <a:off x="6008594" y="4275903"/>
             <a:ext cx="1547700" cy="400110"/>
           </a:xfrm>
           <a:prstGeom prst="rect">
@@ -3276,8 +3285,8 @@
             <a:pPr algn="ctr"/>
             <a:r>
               <a:rPr lang="en-US" sz="2000">
-                <a:latin typeface="Helvetica Neue Light"/>
-                <a:cs typeface="Helvetica Neue Light"/>
+                <a:latin typeface="Lato Light"/>
+                <a:cs typeface="Lato Light"/>
               </a:rPr>
               <a:t>Bifurcations</a:t>
             </a:r>
@@ -3293,7 +3302,7 @@
         <p:spPr>
           <a:xfrm>
             <a:off x="3847701" y="4842226"/>
-            <a:ext cx="1547700" cy="584776"/>
+            <a:ext cx="1547700" cy="338554"/>
           </a:xfrm>
           <a:prstGeom prst="rect">
             <a:avLst/>
@@ -3309,8 +3318,8 @@
             <a:pPr algn="ctr"/>
             <a:r>
               <a:rPr lang="en-US" sz="1600" i="1">
-                <a:latin typeface="Helvetica Neue Light"/>
-                <a:cs typeface="Helvetica Neue Light"/>
+                <a:latin typeface="Lato Light"/>
+                <a:cs typeface="Lato Light"/>
               </a:rPr>
               <a:t>Hopf Bifurcation</a:t>
             </a:r>
@@ -3341,8 +3350,8 @@
             <a:pPr algn="ctr"/>
             <a:r>
               <a:rPr lang="en-US" sz="1600" i="1">
-                <a:latin typeface="Helvetica Neue Light"/>
-                <a:cs typeface="Helvetica Neue Light"/>
+                <a:latin typeface="Lato Light"/>
+                <a:cs typeface="Lato Light"/>
               </a:rPr>
               <a:t>Saddle-Node Bifurcation</a:t>
             </a:r>
@@ -3374,8 +3383,8 @@
             <a:pPr algn="ctr"/>
             <a:r>
               <a:rPr lang="en-US" sz="1600" i="1">
-                <a:latin typeface="Helvetica Neue Light"/>
-                <a:cs typeface="Helvetica Neue Light"/>
+                <a:latin typeface="Lato Light"/>
+                <a:cs typeface="Lato Light"/>
               </a:rPr>
               <a:t>Chaotic Crisis</a:t>
             </a:r>
@@ -3390,7 +3399,7 @@
         </p:nvSpPr>
         <p:spPr>
           <a:xfrm>
-            <a:off x="2511032" y="5571305"/>
+            <a:off x="2031323" y="5278917"/>
             <a:ext cx="1547700" cy="584776"/>
           </a:xfrm>
           <a:prstGeom prst="rect">
@@ -3407,8 +3416,8 @@
             <a:pPr algn="ctr"/>
             <a:r>
               <a:rPr lang="en-US" sz="1600" i="1">
-                <a:latin typeface="Helvetica Neue Light"/>
-                <a:cs typeface="Helvetica Neue Light"/>
+                <a:latin typeface="Lato Light"/>
+                <a:cs typeface="Lato Light"/>
               </a:rPr>
               <a:t>Smooth Transitions</a:t>
             </a:r>
@@ -3440,8 +3449,8 @@
             <a:pPr algn="ctr"/>
             <a:r>
               <a:rPr lang="en-US" sz="1600" i="1">
-                <a:latin typeface="Helvetica Neue Light"/>
-                <a:cs typeface="Helvetica Neue Light"/>
+                <a:latin typeface="Lato Light"/>
+                <a:cs typeface="Lato Light"/>
               </a:rPr>
               <a:t>External Forcing</a:t>
             </a:r>
@@ -3456,7 +3465,7 @@
         </p:nvSpPr>
         <p:spPr>
           <a:xfrm>
-            <a:off x="5722619" y="5155806"/>
+            <a:off x="6015778" y="4842226"/>
             <a:ext cx="1547700" cy="830997"/>
           </a:xfrm>
           <a:prstGeom prst="rect">
@@ -3473,10 +3482,202 @@
             <a:pPr algn="ctr"/>
             <a:r>
               <a:rPr lang="en-US" sz="1600" i="1">
-                <a:latin typeface="Helvetica Neue Light"/>
-                <a:cs typeface="Helvetica Neue Light"/>
+                <a:latin typeface="Lato Light"/>
+                <a:cs typeface="Lato Light"/>
               </a:rPr>
               <a:t>Transition from small to zero population</a:t>
+            </a:r>
+          </a:p>
+        </p:txBody>
+      </p:sp>
+      <p:sp>
+        <p:nvSpPr>
+          <p:cNvPr id="2" name="TextBox 1"/>
+          <p:cNvSpPr txBox="1"/>
+          <p:nvPr/>
+        </p:nvSpPr>
+        <p:spPr>
+          <a:xfrm>
+            <a:off x="4382899" y="4077386"/>
+            <a:ext cx="457039" cy="369332"/>
+          </a:xfrm>
+          <a:prstGeom prst="rect">
+            <a:avLst/>
+          </a:prstGeom>
+          <a:noFill/>
+        </p:spPr>
+        <p:txBody>
+          <a:bodyPr wrap="none" rtlCol="0">
+            <a:spAutoFit/>
+          </a:bodyPr>
+          <a:lstStyle/>
+          <a:p>
+            <a:r>
+              <a:rPr lang="en-US">
+                <a:latin typeface="Lato Light"/>
+                <a:cs typeface="Lato Light"/>
+              </a:rPr>
+              <a:t>(1)</a:t>
+            </a:r>
+          </a:p>
+        </p:txBody>
+      </p:sp>
+      <p:sp>
+        <p:nvSpPr>
+          <p:cNvPr id="18" name="TextBox 17"/>
+          <p:cNvSpPr txBox="1"/>
+          <p:nvPr/>
+        </p:nvSpPr>
+        <p:spPr>
+          <a:xfrm>
+            <a:off x="5787258" y="3175596"/>
+            <a:ext cx="457039" cy="369332"/>
+          </a:xfrm>
+          <a:prstGeom prst="rect">
+            <a:avLst/>
+          </a:prstGeom>
+          <a:noFill/>
+        </p:spPr>
+        <p:txBody>
+          <a:bodyPr wrap="none" rtlCol="0">
+            <a:spAutoFit/>
+          </a:bodyPr>
+          <a:lstStyle/>
+          <a:p>
+            <a:r>
+              <a:rPr lang="en-US">
+                <a:latin typeface="Lato Light"/>
+                <a:cs typeface="Lato Light"/>
+              </a:rPr>
+              <a:t>(2)</a:t>
+            </a:r>
+          </a:p>
+        </p:txBody>
+      </p:sp>
+      <p:sp>
+        <p:nvSpPr>
+          <p:cNvPr id="19" name="TextBox 18"/>
+          <p:cNvSpPr txBox="1"/>
+          <p:nvPr/>
+        </p:nvSpPr>
+        <p:spPr>
+          <a:xfrm>
+            <a:off x="4382899" y="5413650"/>
+            <a:ext cx="457039" cy="369332"/>
+          </a:xfrm>
+          <a:prstGeom prst="rect">
+            <a:avLst/>
+          </a:prstGeom>
+          <a:noFill/>
+        </p:spPr>
+        <p:txBody>
+          <a:bodyPr wrap="none" rtlCol="0">
+            <a:spAutoFit/>
+          </a:bodyPr>
+          <a:lstStyle/>
+          <a:p>
+            <a:r>
+              <a:rPr lang="en-US">
+                <a:latin typeface="Lato Light"/>
+                <a:cs typeface="Lato Light"/>
+              </a:rPr>
+              <a:t>(3)</a:t>
+            </a:r>
+          </a:p>
+        </p:txBody>
+      </p:sp>
+      <p:sp>
+        <p:nvSpPr>
+          <p:cNvPr id="20" name="TextBox 19"/>
+          <p:cNvSpPr txBox="1"/>
+          <p:nvPr/>
+        </p:nvSpPr>
+        <p:spPr>
+          <a:xfrm>
+            <a:off x="2631731" y="5857889"/>
+            <a:ext cx="457039" cy="369332"/>
+          </a:xfrm>
+          <a:prstGeom prst="rect">
+            <a:avLst/>
+          </a:prstGeom>
+          <a:noFill/>
+        </p:spPr>
+        <p:txBody>
+          <a:bodyPr wrap="none" rtlCol="0">
+            <a:spAutoFit/>
+          </a:bodyPr>
+          <a:lstStyle/>
+          <a:p>
+            <a:r>
+              <a:rPr lang="en-US">
+                <a:latin typeface="Lato Light"/>
+                <a:cs typeface="Lato Light"/>
+              </a:rPr>
+              <a:t>(4)</a:t>
+            </a:r>
+          </a:p>
+        </p:txBody>
+      </p:sp>
+      <p:sp>
+        <p:nvSpPr>
+          <p:cNvPr id="21" name="TextBox 20"/>
+          <p:cNvSpPr txBox="1"/>
+          <p:nvPr/>
+        </p:nvSpPr>
+        <p:spPr>
+          <a:xfrm>
+            <a:off x="4374253" y="1800647"/>
+            <a:ext cx="457039" cy="369332"/>
+          </a:xfrm>
+          <a:prstGeom prst="rect">
+            <a:avLst/>
+          </a:prstGeom>
+          <a:noFill/>
+        </p:spPr>
+        <p:txBody>
+          <a:bodyPr wrap="none" rtlCol="0">
+            <a:spAutoFit/>
+          </a:bodyPr>
+          <a:lstStyle/>
+          <a:p>
+            <a:r>
+              <a:rPr lang="en-US">
+                <a:latin typeface="Lato Light"/>
+                <a:cs typeface="Lato Light"/>
+              </a:rPr>
+              <a:t>(6)</a:t>
+            </a:r>
+          </a:p>
+        </p:txBody>
+      </p:sp>
+      <p:sp>
+        <p:nvSpPr>
+          <p:cNvPr id="22" name="TextBox 21"/>
+          <p:cNvSpPr txBox="1"/>
+          <p:nvPr/>
+        </p:nvSpPr>
+        <p:spPr>
+          <a:xfrm>
+            <a:off x="6504798" y="5705160"/>
+            <a:ext cx="457039" cy="369332"/>
+          </a:xfrm>
+          <a:prstGeom prst="rect">
+            <a:avLst/>
+          </a:prstGeom>
+          <a:noFill/>
+        </p:spPr>
+        <p:txBody>
+          <a:bodyPr wrap="none" rtlCol="0">
+            <a:spAutoFit/>
+          </a:bodyPr>
+          <a:lstStyle/>
+          <a:p>
+            <a:r>
+              <a:rPr lang="en-US">
+                <a:latin typeface="Lato Light"/>
+                <a:cs typeface="Lato Light"/>
+              </a:rPr>
+              <a:t>(5)</a:t>
             </a:r>
           </a:p>
         </p:txBody>

</xml_diff>